<commit_message>
Update DevOps - Rakivnenko D.N. - EPAM.pptx
</commit_message>
<xml_diff>
--- a/Presentation and CV/DevOps - Rakivnenko D.N. - EPAM.pptx
+++ b/Presentation and CV/DevOps - Rakivnenko D.N. - EPAM.pptx
@@ -1,9 +1,12 @@
 
 <file path=ppt/presentation.xml><?xml version="1.0" encoding="utf-8"?>
-<p:presentation xmlns:a="http://schemas.openxmlformats.org/drawingml/2006/main" xmlns:r="http://schemas.openxmlformats.org/officeDocument/2006/relationships" xmlns:p="http://schemas.openxmlformats.org/presentationml/2006/main" autoCompressPictures="0">
+<p:presentation xmlns:a="http://schemas.openxmlformats.org/drawingml/2006/main" xmlns:r="http://schemas.openxmlformats.org/officeDocument/2006/relationships" xmlns:p="http://schemas.openxmlformats.org/presentationml/2006/main" showSpecialPlsOnTitleSld="0" autoCompressPictures="0">
   <p:sldMasterIdLst>
     <p:sldMasterId id="2147483648" r:id="rId1"/>
   </p:sldMasterIdLst>
+  <p:notesMasterIdLst>
+    <p:notesMasterId r:id="rId14"/>
+  </p:notesMasterIdLst>
   <p:sldIdLst>
     <p:sldId id="256" r:id="rId2"/>
     <p:sldId id="258" r:id="rId3"/>
@@ -121,6 +124,355 @@
     </p:ext>
   </p:extLst>
 </p:presentation>
+</file>
+
+<file path=ppt/notesMasters/notesMaster1.xml><?xml version="1.0" encoding="utf-8"?>
+<p:notesMaster xmlns:a="http://schemas.openxmlformats.org/drawingml/2006/main" xmlns:r="http://schemas.openxmlformats.org/officeDocument/2006/relationships" xmlns:p="http://schemas.openxmlformats.org/presentationml/2006/main">
+  <p:cSld>
+    <p:bg>
+      <p:bgRef idx="1001">
+        <a:schemeClr val="bg1"/>
+      </p:bgRef>
+    </p:bg>
+    <p:spTree>
+      <p:nvGrpSpPr>
+        <p:cNvPr id="1" name=""/>
+        <p:cNvGrpSpPr/>
+        <p:nvPr/>
+      </p:nvGrpSpPr>
+      <p:grpSpPr>
+        <a:xfrm>
+          <a:off x="0" y="0"/>
+          <a:ext cx="0" cy="0"/>
+          <a:chOff x="0" y="0"/>
+          <a:chExt cx="0" cy="0"/>
+        </a:xfrm>
+      </p:grpSpPr>
+      <p:sp>
+        <p:nvSpPr>
+          <p:cNvPr id="2" name="Header Placeholder 1"/>
+          <p:cNvSpPr>
+            <a:spLocks noGrp="1"/>
+          </p:cNvSpPr>
+          <p:nvPr>
+            <p:ph type="hdr" sz="quarter"/>
+          </p:nvPr>
+        </p:nvSpPr>
+        <p:spPr>
+          <a:xfrm>
+            <a:off x="0" y="0"/>
+            <a:ext cx="2971800" cy="458788"/>
+          </a:xfrm>
+          <a:prstGeom prst="rect">
+            <a:avLst/>
+          </a:prstGeom>
+        </p:spPr>
+        <p:txBody>
+          <a:bodyPr vert="horz" lIns="91440" tIns="45720" rIns="91440" bIns="45720" rtlCol="0"/>
+          <a:lstStyle>
+            <a:lvl1pPr algn="l">
+              <a:defRPr sz="1200"/>
+            </a:lvl1pPr>
+          </a:lstStyle>
+          <a:p>
+            <a:endParaRPr lang="en-US"/>
+          </a:p>
+        </p:txBody>
+      </p:sp>
+      <p:sp>
+        <p:nvSpPr>
+          <p:cNvPr id="3" name="Date Placeholder 2"/>
+          <p:cNvSpPr>
+            <a:spLocks noGrp="1"/>
+          </p:cNvSpPr>
+          <p:nvPr>
+            <p:ph type="dt" idx="1"/>
+          </p:nvPr>
+        </p:nvSpPr>
+        <p:spPr>
+          <a:xfrm>
+            <a:off x="3884613" y="0"/>
+            <a:ext cx="2971800" cy="458788"/>
+          </a:xfrm>
+          <a:prstGeom prst="rect">
+            <a:avLst/>
+          </a:prstGeom>
+        </p:spPr>
+        <p:txBody>
+          <a:bodyPr vert="horz" lIns="91440" tIns="45720" rIns="91440" bIns="45720" rtlCol="0"/>
+          <a:lstStyle>
+            <a:lvl1pPr algn="r">
+              <a:defRPr sz="1200"/>
+            </a:lvl1pPr>
+          </a:lstStyle>
+          <a:p>
+            <a:fld id="{CD6EFEA3-2446-4446-9F14-9430D3CC6F96}" type="datetimeFigureOut">
+              <a:rPr lang="en-US" smtClean="0"/>
+              <a:t>11/7/2019</a:t>
+            </a:fld>
+            <a:endParaRPr lang="en-US"/>
+          </a:p>
+        </p:txBody>
+      </p:sp>
+      <p:sp>
+        <p:nvSpPr>
+          <p:cNvPr id="4" name="Slide Image Placeholder 3"/>
+          <p:cNvSpPr>
+            <a:spLocks noGrp="1" noRot="1" noChangeAspect="1"/>
+          </p:cNvSpPr>
+          <p:nvPr>
+            <p:ph type="sldImg" idx="2"/>
+          </p:nvPr>
+        </p:nvSpPr>
+        <p:spPr>
+          <a:xfrm>
+            <a:off x="685800" y="1143000"/>
+            <a:ext cx="5486400" cy="3086100"/>
+          </a:xfrm>
+          <a:prstGeom prst="rect">
+            <a:avLst/>
+          </a:prstGeom>
+          <a:noFill/>
+          <a:ln w="12700">
+            <a:solidFill>
+              <a:prstClr val="black"/>
+            </a:solidFill>
+          </a:ln>
+        </p:spPr>
+        <p:txBody>
+          <a:bodyPr vert="horz" lIns="91440" tIns="45720" rIns="91440" bIns="45720" rtlCol="0" anchor="ctr"/>
+          <a:lstStyle/>
+          <a:p>
+            <a:endParaRPr lang="en-US"/>
+          </a:p>
+        </p:txBody>
+      </p:sp>
+      <p:sp>
+        <p:nvSpPr>
+          <p:cNvPr id="5" name="Notes Placeholder 4"/>
+          <p:cNvSpPr>
+            <a:spLocks noGrp="1"/>
+          </p:cNvSpPr>
+          <p:nvPr>
+            <p:ph type="body" sz="quarter" idx="3"/>
+          </p:nvPr>
+        </p:nvSpPr>
+        <p:spPr>
+          <a:xfrm>
+            <a:off x="685800" y="4400550"/>
+            <a:ext cx="5486400" cy="3600450"/>
+          </a:xfrm>
+          <a:prstGeom prst="rect">
+            <a:avLst/>
+          </a:prstGeom>
+        </p:spPr>
+        <p:txBody>
+          <a:bodyPr vert="horz" lIns="91440" tIns="45720" rIns="91440" bIns="45720" rtlCol="0"/>
+          <a:lstStyle/>
+          <a:p>
+            <a:pPr lvl="0"/>
+            <a:r>
+              <a:rPr lang="en-US"/>
+              <a:t>Click to edit Master text styles</a:t>
+            </a:r>
+          </a:p>
+          <a:p>
+            <a:pPr lvl="1"/>
+            <a:r>
+              <a:rPr lang="en-US"/>
+              <a:t>Second level</a:t>
+            </a:r>
+          </a:p>
+          <a:p>
+            <a:pPr lvl="2"/>
+            <a:r>
+              <a:rPr lang="en-US"/>
+              <a:t>Third level</a:t>
+            </a:r>
+          </a:p>
+          <a:p>
+            <a:pPr lvl="3"/>
+            <a:r>
+              <a:rPr lang="en-US"/>
+              <a:t>Fourth level</a:t>
+            </a:r>
+          </a:p>
+          <a:p>
+            <a:pPr lvl="4"/>
+            <a:r>
+              <a:rPr lang="en-US"/>
+              <a:t>Fifth level</a:t>
+            </a:r>
+          </a:p>
+        </p:txBody>
+      </p:sp>
+      <p:sp>
+        <p:nvSpPr>
+          <p:cNvPr id="6" name="Footer Placeholder 5"/>
+          <p:cNvSpPr>
+            <a:spLocks noGrp="1"/>
+          </p:cNvSpPr>
+          <p:nvPr>
+            <p:ph type="ftr" sz="quarter" idx="4"/>
+          </p:nvPr>
+        </p:nvSpPr>
+        <p:spPr>
+          <a:xfrm>
+            <a:off x="0" y="8685213"/>
+            <a:ext cx="2971800" cy="458787"/>
+          </a:xfrm>
+          <a:prstGeom prst="rect">
+            <a:avLst/>
+          </a:prstGeom>
+        </p:spPr>
+        <p:txBody>
+          <a:bodyPr vert="horz" lIns="91440" tIns="45720" rIns="91440" bIns="45720" rtlCol="0" anchor="b"/>
+          <a:lstStyle>
+            <a:lvl1pPr algn="l">
+              <a:defRPr sz="1200"/>
+            </a:lvl1pPr>
+          </a:lstStyle>
+          <a:p>
+            <a:endParaRPr lang="en-US"/>
+          </a:p>
+        </p:txBody>
+      </p:sp>
+      <p:sp>
+        <p:nvSpPr>
+          <p:cNvPr id="7" name="Slide Number Placeholder 6"/>
+          <p:cNvSpPr>
+            <a:spLocks noGrp="1"/>
+          </p:cNvSpPr>
+          <p:nvPr>
+            <p:ph type="sldNum" sz="quarter" idx="5"/>
+          </p:nvPr>
+        </p:nvSpPr>
+        <p:spPr>
+          <a:xfrm>
+            <a:off x="3884613" y="8685213"/>
+            <a:ext cx="2971800" cy="458787"/>
+          </a:xfrm>
+          <a:prstGeom prst="rect">
+            <a:avLst/>
+          </a:prstGeom>
+        </p:spPr>
+        <p:txBody>
+          <a:bodyPr vert="horz" lIns="91440" tIns="45720" rIns="91440" bIns="45720" rtlCol="0" anchor="b"/>
+          <a:lstStyle>
+            <a:lvl1pPr algn="r">
+              <a:defRPr sz="1200"/>
+            </a:lvl1pPr>
+          </a:lstStyle>
+          <a:p>
+            <a:fld id="{D9DAED22-1960-438D-8196-6BAA578936FA}" type="slidenum">
+              <a:rPr lang="en-US" smtClean="0"/>
+              <a:t>‹#›</a:t>
+            </a:fld>
+            <a:endParaRPr lang="en-US"/>
+          </a:p>
+        </p:txBody>
+      </p:sp>
+    </p:spTree>
+    <p:extLst>
+      <p:ext uri="{BB962C8B-B14F-4D97-AF65-F5344CB8AC3E}">
+        <p14:creationId xmlns:p14="http://schemas.microsoft.com/office/powerpoint/2010/main" val="4047692986"/>
+      </p:ext>
+    </p:extLst>
+  </p:cSld>
+  <p:clrMap bg1="lt1" tx1="dk1" bg2="lt2" tx2="dk2" accent1="accent1" accent2="accent2" accent3="accent3" accent4="accent4" accent5="accent5" accent6="accent6" hlink="hlink" folHlink="folHlink"/>
+  <p:notesStyle>
+    <a:lvl1pPr marL="0" algn="l" defTabSz="914400" rtl="0" eaLnBrk="1" latinLnBrk="0" hangingPunct="1">
+      <a:defRPr sz="1200" kern="1200">
+        <a:solidFill>
+          <a:schemeClr val="tx1"/>
+        </a:solidFill>
+        <a:latin typeface="+mn-lt"/>
+        <a:ea typeface="+mn-ea"/>
+        <a:cs typeface="+mn-cs"/>
+      </a:defRPr>
+    </a:lvl1pPr>
+    <a:lvl2pPr marL="457200" algn="l" defTabSz="914400" rtl="0" eaLnBrk="1" latinLnBrk="0" hangingPunct="1">
+      <a:defRPr sz="1200" kern="1200">
+        <a:solidFill>
+          <a:schemeClr val="tx1"/>
+        </a:solidFill>
+        <a:latin typeface="+mn-lt"/>
+        <a:ea typeface="+mn-ea"/>
+        <a:cs typeface="+mn-cs"/>
+      </a:defRPr>
+    </a:lvl2pPr>
+    <a:lvl3pPr marL="914400" algn="l" defTabSz="914400" rtl="0" eaLnBrk="1" latinLnBrk="0" hangingPunct="1">
+      <a:defRPr sz="1200" kern="1200">
+        <a:solidFill>
+          <a:schemeClr val="tx1"/>
+        </a:solidFill>
+        <a:latin typeface="+mn-lt"/>
+        <a:ea typeface="+mn-ea"/>
+        <a:cs typeface="+mn-cs"/>
+      </a:defRPr>
+    </a:lvl3pPr>
+    <a:lvl4pPr marL="1371600" algn="l" defTabSz="914400" rtl="0" eaLnBrk="1" latinLnBrk="0" hangingPunct="1">
+      <a:defRPr sz="1200" kern="1200">
+        <a:solidFill>
+          <a:schemeClr val="tx1"/>
+        </a:solidFill>
+        <a:latin typeface="+mn-lt"/>
+        <a:ea typeface="+mn-ea"/>
+        <a:cs typeface="+mn-cs"/>
+      </a:defRPr>
+    </a:lvl4pPr>
+    <a:lvl5pPr marL="1828800" algn="l" defTabSz="914400" rtl="0" eaLnBrk="1" latinLnBrk="0" hangingPunct="1">
+      <a:defRPr sz="1200" kern="1200">
+        <a:solidFill>
+          <a:schemeClr val="tx1"/>
+        </a:solidFill>
+        <a:latin typeface="+mn-lt"/>
+        <a:ea typeface="+mn-ea"/>
+        <a:cs typeface="+mn-cs"/>
+      </a:defRPr>
+    </a:lvl5pPr>
+    <a:lvl6pPr marL="2286000" algn="l" defTabSz="914400" rtl="0" eaLnBrk="1" latinLnBrk="0" hangingPunct="1">
+      <a:defRPr sz="1200" kern="1200">
+        <a:solidFill>
+          <a:schemeClr val="tx1"/>
+        </a:solidFill>
+        <a:latin typeface="+mn-lt"/>
+        <a:ea typeface="+mn-ea"/>
+        <a:cs typeface="+mn-cs"/>
+      </a:defRPr>
+    </a:lvl6pPr>
+    <a:lvl7pPr marL="2743200" algn="l" defTabSz="914400" rtl="0" eaLnBrk="1" latinLnBrk="0" hangingPunct="1">
+      <a:defRPr sz="1200" kern="1200">
+        <a:solidFill>
+          <a:schemeClr val="tx1"/>
+        </a:solidFill>
+        <a:latin typeface="+mn-lt"/>
+        <a:ea typeface="+mn-ea"/>
+        <a:cs typeface="+mn-cs"/>
+      </a:defRPr>
+    </a:lvl7pPr>
+    <a:lvl8pPr marL="3200400" algn="l" defTabSz="914400" rtl="0" eaLnBrk="1" latinLnBrk="0" hangingPunct="1">
+      <a:defRPr sz="1200" kern="1200">
+        <a:solidFill>
+          <a:schemeClr val="tx1"/>
+        </a:solidFill>
+        <a:latin typeface="+mn-lt"/>
+        <a:ea typeface="+mn-ea"/>
+        <a:cs typeface="+mn-cs"/>
+      </a:defRPr>
+    </a:lvl8pPr>
+    <a:lvl9pPr marL="3657600" algn="l" defTabSz="914400" rtl="0" eaLnBrk="1" latinLnBrk="0" hangingPunct="1">
+      <a:defRPr sz="1200" kern="1200">
+        <a:solidFill>
+          <a:schemeClr val="tx1"/>
+        </a:solidFill>
+        <a:latin typeface="+mn-lt"/>
+        <a:ea typeface="+mn-ea"/>
+        <a:cs typeface="+mn-cs"/>
+      </a:defRPr>
+    </a:lvl9pPr>
+  </p:notesStyle>
+</p:notesMaster>
 </file>
 
 <file path=ppt/slideLayouts/slideLayout1.xml><?xml version="1.0" encoding="utf-8"?>
@@ -623,10 +975,9 @@
           <a:bodyPr/>
           <a:lstStyle/>
           <a:p>
-            <a:fld id="{B61BEF0D-F0BB-DE4B-95CE-6DB70DBA9567}" type="datetimeFigureOut">
-              <a:rPr lang="en-US" dirty="0"/>
-              <a:pPr/>
-              <a:t>11/5/2019</a:t>
+            <a:fld id="{55DA0BEE-D3BB-4D81-993D-329A0B6B838B}" type="datetime1">
+              <a:rPr lang="en-US" smtClean="0"/>
+              <a:t>11/7/2019</a:t>
             </a:fld>
             <a:endParaRPr lang="en-US" dirty="0"/>
           </a:p>
@@ -916,10 +1267,9 @@
           <a:bodyPr/>
           <a:lstStyle/>
           <a:p>
-            <a:fld id="{B61BEF0D-F0BB-DE4B-95CE-6DB70DBA9567}" type="datetimeFigureOut">
-              <a:rPr lang="en-US" dirty="0"/>
-              <a:pPr/>
-              <a:t>11/5/2019</a:t>
+            <a:fld id="{9C6B8B98-48BD-4D2D-AD35-203AB72A4C35}" type="datetime1">
+              <a:rPr lang="en-US" smtClean="0"/>
+              <a:t>11/7/2019</a:t>
             </a:fld>
             <a:endParaRPr lang="en-US" dirty="0"/>
           </a:p>
@@ -1161,10 +1511,9 @@
           <a:bodyPr/>
           <a:lstStyle/>
           <a:p>
-            <a:fld id="{B61BEF0D-F0BB-DE4B-95CE-6DB70DBA9567}" type="datetimeFigureOut">
-              <a:rPr lang="en-US" dirty="0"/>
-              <a:pPr/>
-              <a:t>11/5/2019</a:t>
+            <a:fld id="{9B74596D-6FF5-4174-8732-ED733BABF8FD}" type="datetime1">
+              <a:rPr lang="en-US" smtClean="0"/>
+              <a:t>11/7/2019</a:t>
             </a:fld>
             <a:endParaRPr lang="en-US" dirty="0"/>
           </a:p>
@@ -1698,10 +2047,9 @@
           <a:bodyPr/>
           <a:lstStyle/>
           <a:p>
-            <a:fld id="{B61BEF0D-F0BB-DE4B-95CE-6DB70DBA9567}" type="datetimeFigureOut">
-              <a:rPr lang="en-US" dirty="0"/>
-              <a:pPr/>
-              <a:t>11/5/2019</a:t>
+            <a:fld id="{1C3A0CE1-74B3-4EE0-9D66-4A4119FE91C2}" type="datetime1">
+              <a:rPr lang="en-US" smtClean="0"/>
+              <a:t>11/7/2019</a:t>
             </a:fld>
             <a:endParaRPr lang="en-US" dirty="0"/>
           </a:p>
@@ -1943,10 +2291,9 @@
           <a:bodyPr/>
           <a:lstStyle/>
           <a:p>
-            <a:fld id="{B61BEF0D-F0BB-DE4B-95CE-6DB70DBA9567}" type="datetimeFigureOut">
-              <a:rPr lang="en-US" dirty="0"/>
-              <a:pPr/>
-              <a:t>11/5/2019</a:t>
+            <a:fld id="{1A35448E-58A5-447E-B725-3692B3CF6C7E}" type="datetime1">
+              <a:rPr lang="en-US" smtClean="0"/>
+              <a:t>11/7/2019</a:t>
             </a:fld>
             <a:endParaRPr lang="en-US" dirty="0"/>
           </a:p>
@@ -2472,10 +2819,9 @@
           <a:bodyPr/>
           <a:lstStyle/>
           <a:p>
-            <a:fld id="{B61BEF0D-F0BB-DE4B-95CE-6DB70DBA9567}" type="datetimeFigureOut">
-              <a:rPr lang="en-US" dirty="0"/>
-              <a:pPr/>
-              <a:t>11/5/2019</a:t>
+            <a:fld id="{83BC4098-1D3C-4730-942F-34F208C2DF09}" type="datetime1">
+              <a:rPr lang="en-US" smtClean="0"/>
+              <a:t>11/7/2019</a:t>
             </a:fld>
             <a:endParaRPr lang="en-US" dirty="0"/>
           </a:p>
@@ -2766,10 +3112,9 @@
           <a:bodyPr/>
           <a:lstStyle/>
           <a:p>
-            <a:fld id="{B61BEF0D-F0BB-DE4B-95CE-6DB70DBA9567}" type="datetimeFigureOut">
-              <a:rPr lang="en-US" dirty="0"/>
-              <a:pPr/>
-              <a:t>11/5/2019</a:t>
+            <a:fld id="{2C54B4C6-5FC4-45F4-AC4A-C6627C946FE2}" type="datetime1">
+              <a:rPr lang="en-US" smtClean="0"/>
+              <a:t>11/7/2019</a:t>
             </a:fld>
             <a:endParaRPr lang="en-US" dirty="0"/>
           </a:p>
@@ -2937,10 +3282,9 @@
           <a:bodyPr/>
           <a:lstStyle/>
           <a:p>
-            <a:fld id="{B61BEF0D-F0BB-DE4B-95CE-6DB70DBA9567}" type="datetimeFigureOut">
-              <a:rPr lang="en-US" dirty="0"/>
-              <a:pPr/>
-              <a:t>11/5/2019</a:t>
+            <a:fld id="{C6EC653B-AC74-40A7-824C-1FB527E80CD2}" type="datetime1">
+              <a:rPr lang="en-US" smtClean="0"/>
+              <a:t>11/7/2019</a:t>
             </a:fld>
             <a:endParaRPr lang="en-US" dirty="0"/>
           </a:p>
@@ -3114,10 +3458,9 @@
           <a:bodyPr/>
           <a:lstStyle/>
           <a:p>
-            <a:fld id="{B61BEF0D-F0BB-DE4B-95CE-6DB70DBA9567}" type="datetimeFigureOut">
-              <a:rPr lang="en-US" dirty="0"/>
-              <a:pPr/>
-              <a:t>11/5/2019</a:t>
+            <a:fld id="{AB2D4C55-F7CA-41F4-8532-591119563968}" type="datetime1">
+              <a:rPr lang="en-US" smtClean="0"/>
+              <a:t>11/7/2019</a:t>
             </a:fld>
             <a:endParaRPr lang="en-US" dirty="0"/>
           </a:p>
@@ -3281,10 +3624,9 @@
           <a:bodyPr/>
           <a:lstStyle/>
           <a:p>
-            <a:fld id="{B61BEF0D-F0BB-DE4B-95CE-6DB70DBA9567}" type="datetimeFigureOut">
-              <a:rPr lang="en-US" dirty="0"/>
-              <a:pPr/>
-              <a:t>11/5/2019</a:t>
+            <a:fld id="{6762DDDF-B9DC-4485-891A-400BE2D5948E}" type="datetime1">
+              <a:rPr lang="en-US" smtClean="0"/>
+              <a:t>11/7/2019</a:t>
             </a:fld>
             <a:endParaRPr lang="en-US" dirty="0"/>
           </a:p>
@@ -3529,10 +3871,9 @@
           <a:bodyPr/>
           <a:lstStyle/>
           <a:p>
-            <a:fld id="{B61BEF0D-F0BB-DE4B-95CE-6DB70DBA9567}" type="datetimeFigureOut">
-              <a:rPr lang="en-US" dirty="0"/>
-              <a:pPr/>
-              <a:t>11/5/2019</a:t>
+            <a:fld id="{CD4B3880-1FB4-4191-9AE2-8E067CED6E91}" type="datetime1">
+              <a:rPr lang="en-US" smtClean="0"/>
+              <a:t>11/7/2019</a:t>
             </a:fld>
             <a:endParaRPr lang="en-US" dirty="0"/>
           </a:p>
@@ -3823,10 +4164,9 @@
           <a:bodyPr/>
           <a:lstStyle/>
           <a:p>
-            <a:fld id="{B61BEF0D-F0BB-DE4B-95CE-6DB70DBA9567}" type="datetimeFigureOut">
-              <a:rPr lang="en-US" dirty="0"/>
-              <a:pPr/>
-              <a:t>11/5/2019</a:t>
+            <a:fld id="{7F4582E1-2B2A-454D-9896-AE86A7379773}" type="datetime1">
+              <a:rPr lang="en-US" smtClean="0"/>
+              <a:t>11/7/2019</a:t>
             </a:fld>
             <a:endParaRPr lang="en-US" dirty="0"/>
           </a:p>
@@ -4262,10 +4602,9 @@
           <a:bodyPr/>
           <a:lstStyle/>
           <a:p>
-            <a:fld id="{B61BEF0D-F0BB-DE4B-95CE-6DB70DBA9567}" type="datetimeFigureOut">
-              <a:rPr lang="en-US" dirty="0"/>
-              <a:pPr/>
-              <a:t>11/5/2019</a:t>
+            <a:fld id="{912D333F-D4A9-4E83-975D-E2E232DA8973}" type="datetime1">
+              <a:rPr lang="en-US" smtClean="0"/>
+              <a:t>11/7/2019</a:t>
             </a:fld>
             <a:endParaRPr lang="en-US" dirty="0"/>
           </a:p>
@@ -4377,10 +4716,9 @@
           <a:bodyPr/>
           <a:lstStyle/>
           <a:p>
-            <a:fld id="{B61BEF0D-F0BB-DE4B-95CE-6DB70DBA9567}" type="datetimeFigureOut">
-              <a:rPr lang="en-US" dirty="0"/>
-              <a:pPr/>
-              <a:t>11/5/2019</a:t>
+            <a:fld id="{B9E81255-FAA2-43FD-8E24-1B27CD6FC368}" type="datetime1">
+              <a:rPr lang="en-US" smtClean="0"/>
+              <a:t>11/7/2019</a:t>
             </a:fld>
             <a:endParaRPr lang="en-US" dirty="0"/>
           </a:p>
@@ -4469,10 +4807,9 @@
           <a:bodyPr/>
           <a:lstStyle/>
           <a:p>
-            <a:fld id="{B61BEF0D-F0BB-DE4B-95CE-6DB70DBA9567}" type="datetimeFigureOut">
-              <a:rPr lang="en-US" dirty="0"/>
-              <a:pPr/>
-              <a:t>11/5/2019</a:t>
+            <a:fld id="{179F7E11-84B3-4F73-8BAB-C7CE446EB258}" type="datetime1">
+              <a:rPr lang="en-US" smtClean="0"/>
+              <a:t>11/7/2019</a:t>
             </a:fld>
             <a:endParaRPr lang="en-US" dirty="0"/>
           </a:p>
@@ -4749,10 +5086,9 @@
           <a:bodyPr/>
           <a:lstStyle/>
           <a:p>
-            <a:fld id="{B61BEF0D-F0BB-DE4B-95CE-6DB70DBA9567}" type="datetimeFigureOut">
-              <a:rPr lang="en-US" dirty="0"/>
-              <a:pPr/>
-              <a:t>11/5/2019</a:t>
+            <a:fld id="{516D1653-036E-4E2F-BCC0-188E776299C3}" type="datetime1">
+              <a:rPr lang="en-US" smtClean="0"/>
+              <a:t>11/7/2019</a:t>
             </a:fld>
             <a:endParaRPr lang="en-US" dirty="0"/>
           </a:p>
@@ -5037,10 +5373,9 @@
           <a:bodyPr/>
           <a:lstStyle/>
           <a:p>
-            <a:fld id="{B61BEF0D-F0BB-DE4B-95CE-6DB70DBA9567}" type="datetimeFigureOut">
-              <a:rPr lang="en-US" dirty="0"/>
-              <a:pPr/>
-              <a:t>11/5/2019</a:t>
+            <a:fld id="{C4D71DD0-37E8-4F96-B39E-93B4F814FD89}" type="datetime1">
+              <a:rPr lang="en-US" smtClean="0"/>
+              <a:t>11/7/2019</a:t>
             </a:fld>
             <a:endParaRPr lang="en-US" dirty="0"/>
           </a:p>
@@ -5564,10 +5899,9 @@
             </a:lvl1pPr>
           </a:lstStyle>
           <a:p>
-            <a:fld id="{B61BEF0D-F0BB-DE4B-95CE-6DB70DBA9567}" type="datetimeFigureOut">
-              <a:rPr lang="en-US" dirty="0"/>
-              <a:pPr/>
-              <a:t>11/5/2019</a:t>
+            <a:fld id="{FE743E85-F60D-4EC2-886E-211B8F5B4E1E}" type="datetime1">
+              <a:rPr lang="en-US" smtClean="0"/>
+              <a:t>11/7/2019</a:t>
             </a:fld>
             <a:endParaRPr lang="en-US" dirty="0"/>
           </a:p>
@@ -5674,6 +6008,7 @@
     <p:sldLayoutId id="2147483658" r:id="rId16"/>
     <p:sldLayoutId id="2147483659" r:id="rId17"/>
   </p:sldLayoutIdLst>
+  <p:hf hdr="0" ftr="0" dt="0"/>
   <p:txStyles>
     <p:titleStyle>
       <a:lvl1pPr algn="ctr" defTabSz="457200" rtl="0" eaLnBrk="1" latinLnBrk="0" hangingPunct="1">
@@ -6586,6 +6921,36 @@
               <a:t>Petclinic.java updates</a:t>
             </a:r>
             <a:endParaRPr lang="ru-RU" dirty="0"/>
+          </a:p>
+        </p:txBody>
+      </p:sp>
+      <p:sp>
+        <p:nvSpPr>
+          <p:cNvPr id="9" name="Slide Number Placeholder 8">
+            <a:extLst>
+              <a:ext uri="{FF2B5EF4-FFF2-40B4-BE49-F238E27FC236}">
+                <a16:creationId xmlns:a16="http://schemas.microsoft.com/office/drawing/2014/main" id="{14CFBF62-5885-4D47-8EA1-B62E982FC99D}"/>
+              </a:ext>
+            </a:extLst>
+          </p:cNvPr>
+          <p:cNvSpPr>
+            <a:spLocks noGrp="1"/>
+          </p:cNvSpPr>
+          <p:nvPr>
+            <p:ph type="sldNum" sz="quarter" idx="12"/>
+          </p:nvPr>
+        </p:nvSpPr>
+        <p:spPr/>
+        <p:txBody>
+          <a:bodyPr/>
+          <a:lstStyle/>
+          <a:p>
+            <a:fld id="{D57F1E4F-1CFF-5643-939E-217C01CDF565}" type="slidenum">
+              <a:rPr lang="en-US" smtClean="0"/>
+              <a:pPr/>
+              <a:t>10</a:t>
+            </a:fld>
+            <a:endParaRPr lang="en-US" dirty="0"/>
           </a:p>
         </p:txBody>
       </p:sp>
@@ -7346,6 +7711,36 @@
           </a:effectLst>
         </p:spPr>
       </p:pic>
+      <p:sp>
+        <p:nvSpPr>
+          <p:cNvPr id="3" name="Slide Number Placeholder 2">
+            <a:extLst>
+              <a:ext uri="{FF2B5EF4-FFF2-40B4-BE49-F238E27FC236}">
+                <a16:creationId xmlns:a16="http://schemas.microsoft.com/office/drawing/2014/main" id="{F08077D9-415E-4F0F-810B-D2777A522E5A}"/>
+              </a:ext>
+            </a:extLst>
+          </p:cNvPr>
+          <p:cNvSpPr>
+            <a:spLocks noGrp="1"/>
+          </p:cNvSpPr>
+          <p:nvPr>
+            <p:ph type="sldNum" sz="quarter" idx="12"/>
+          </p:nvPr>
+        </p:nvSpPr>
+        <p:spPr/>
+        <p:txBody>
+          <a:bodyPr/>
+          <a:lstStyle/>
+          <a:p>
+            <a:fld id="{D57F1E4F-1CFF-5643-939E-217C01CDF565}" type="slidenum">
+              <a:rPr lang="en-US" smtClean="0"/>
+              <a:pPr/>
+              <a:t>11</a:t>
+            </a:fld>
+            <a:endParaRPr lang="en-US" dirty="0"/>
+          </a:p>
+        </p:txBody>
+      </p:sp>
     </p:spTree>
     <p:extLst>
       <p:ext uri="{BB962C8B-B14F-4D97-AF65-F5344CB8AC3E}">
@@ -7672,6 +8067,36 @@
               <a:t>Q&amp;A session. </a:t>
             </a:r>
             <a:endParaRPr lang="ru-RU" dirty="0"/>
+          </a:p>
+        </p:txBody>
+      </p:sp>
+      <p:sp>
+        <p:nvSpPr>
+          <p:cNvPr id="3" name="Slide Number Placeholder 2">
+            <a:extLst>
+              <a:ext uri="{FF2B5EF4-FFF2-40B4-BE49-F238E27FC236}">
+                <a16:creationId xmlns:a16="http://schemas.microsoft.com/office/drawing/2014/main" id="{A1CBFBE8-5C69-4705-AA42-B45A7D7DD511}"/>
+              </a:ext>
+            </a:extLst>
+          </p:cNvPr>
+          <p:cNvSpPr>
+            <a:spLocks noGrp="1"/>
+          </p:cNvSpPr>
+          <p:nvPr>
+            <p:ph type="sldNum" sz="quarter" idx="12"/>
+          </p:nvPr>
+        </p:nvSpPr>
+        <p:spPr/>
+        <p:txBody>
+          <a:bodyPr/>
+          <a:lstStyle/>
+          <a:p>
+            <a:fld id="{D57F1E4F-1CFF-5643-939E-217C01CDF565}" type="slidenum">
+              <a:rPr lang="en-US" smtClean="0"/>
+              <a:pPr/>
+              <a:t>12</a:t>
+            </a:fld>
+            <a:endParaRPr lang="en-US" dirty="0"/>
           </a:p>
         </p:txBody>
       </p:sp>
@@ -8471,6 +8896,36 @@
           </a:p>
         </p:txBody>
       </p:sp>
+      <p:sp>
+        <p:nvSpPr>
+          <p:cNvPr id="3" name="Slide Number Placeholder 2">
+            <a:extLst>
+              <a:ext uri="{FF2B5EF4-FFF2-40B4-BE49-F238E27FC236}">
+                <a16:creationId xmlns:a16="http://schemas.microsoft.com/office/drawing/2014/main" id="{BDC476BC-CC7C-4C0C-8FC3-A9811774CF09}"/>
+              </a:ext>
+            </a:extLst>
+          </p:cNvPr>
+          <p:cNvSpPr>
+            <a:spLocks noGrp="1"/>
+          </p:cNvSpPr>
+          <p:nvPr>
+            <p:ph type="sldNum" sz="quarter" idx="12"/>
+          </p:nvPr>
+        </p:nvSpPr>
+        <p:spPr/>
+        <p:txBody>
+          <a:bodyPr/>
+          <a:lstStyle/>
+          <a:p>
+            <a:fld id="{D57F1E4F-1CFF-5643-939E-217C01CDF565}" type="slidenum">
+              <a:rPr lang="en-US" smtClean="0"/>
+              <a:pPr/>
+              <a:t>2</a:t>
+            </a:fld>
+            <a:endParaRPr lang="en-US" dirty="0"/>
+          </a:p>
+        </p:txBody>
+      </p:sp>
     </p:spTree>
     <p:extLst>
       <p:ext uri="{BB962C8B-B14F-4D97-AF65-F5344CB8AC3E}">
@@ -9449,6 +9904,36 @@
               <a:t>*- Provisioning, Configuration management, and Application-deployment</a:t>
             </a:r>
             <a:endParaRPr lang="ru-RU" sz="1200" dirty="0"/>
+          </a:p>
+        </p:txBody>
+      </p:sp>
+      <p:sp>
+        <p:nvSpPr>
+          <p:cNvPr id="7" name="Slide Number Placeholder 6">
+            <a:extLst>
+              <a:ext uri="{FF2B5EF4-FFF2-40B4-BE49-F238E27FC236}">
+                <a16:creationId xmlns:a16="http://schemas.microsoft.com/office/drawing/2014/main" id="{D67A496D-6D3C-460D-B7F5-06065A4365CE}"/>
+              </a:ext>
+            </a:extLst>
+          </p:cNvPr>
+          <p:cNvSpPr>
+            <a:spLocks noGrp="1"/>
+          </p:cNvSpPr>
+          <p:nvPr>
+            <p:ph type="sldNum" sz="quarter" idx="12"/>
+          </p:nvPr>
+        </p:nvSpPr>
+        <p:spPr/>
+        <p:txBody>
+          <a:bodyPr/>
+          <a:lstStyle/>
+          <a:p>
+            <a:fld id="{D57F1E4F-1CFF-5643-939E-217C01CDF565}" type="slidenum">
+              <a:rPr lang="en-US" smtClean="0"/>
+              <a:pPr/>
+              <a:t>3</a:t>
+            </a:fld>
+            <a:endParaRPr lang="en-US" dirty="0"/>
           </a:p>
         </p:txBody>
       </p:sp>
@@ -10494,7 +10979,7 @@
         </p:blipFill>
         <p:spPr>
           <a:xfrm>
-            <a:off x="0" y="0"/>
+            <a:off x="2796" y="0"/>
             <a:ext cx="12192000" cy="6858000"/>
           </a:xfrm>
           <a:prstGeom prst="rect">
@@ -10535,6 +11020,40 @@
               <a:t>Project Structure </a:t>
             </a:r>
             <a:endParaRPr lang="ru-RU" sz="3200" b="1" dirty="0"/>
+          </a:p>
+        </p:txBody>
+      </p:sp>
+      <p:sp>
+        <p:nvSpPr>
+          <p:cNvPr id="2" name="Slide Number Placeholder 1">
+            <a:extLst>
+              <a:ext uri="{FF2B5EF4-FFF2-40B4-BE49-F238E27FC236}">
+                <a16:creationId xmlns:a16="http://schemas.microsoft.com/office/drawing/2014/main" id="{C11B44C3-47BF-429A-91B3-0FCC95CAB9B3}"/>
+              </a:ext>
+            </a:extLst>
+          </p:cNvPr>
+          <p:cNvSpPr>
+            <a:spLocks noGrp="1"/>
+          </p:cNvSpPr>
+          <p:nvPr>
+            <p:ph type="sldNum" sz="quarter" idx="12"/>
+          </p:nvPr>
+        </p:nvSpPr>
+        <p:spPr>
+          <a:xfrm>
+            <a:off x="11337575" y="6007031"/>
+            <a:ext cx="551167" cy="373310"/>
+          </a:xfrm>
+        </p:spPr>
+        <p:txBody>
+          <a:bodyPr/>
+          <a:lstStyle/>
+          <a:p>
+            <a:r>
+              <a:rPr lang="ru-RU" dirty="0"/>
+              <a:t>3</a:t>
+            </a:r>
+            <a:endParaRPr lang="en-US" dirty="0"/>
           </a:p>
         </p:txBody>
       </p:sp>
@@ -11190,6 +11709,36 @@
           </a:prstGeom>
         </p:spPr>
       </p:pic>
+      <p:sp>
+        <p:nvSpPr>
+          <p:cNvPr id="4" name="Slide Number Placeholder 3">
+            <a:extLst>
+              <a:ext uri="{FF2B5EF4-FFF2-40B4-BE49-F238E27FC236}">
+                <a16:creationId xmlns:a16="http://schemas.microsoft.com/office/drawing/2014/main" id="{3D389ED4-D9AD-44F5-99B5-794B9167E6C9}"/>
+              </a:ext>
+            </a:extLst>
+          </p:cNvPr>
+          <p:cNvSpPr>
+            <a:spLocks noGrp="1"/>
+          </p:cNvSpPr>
+          <p:nvPr>
+            <p:ph type="sldNum" sz="quarter" idx="12"/>
+          </p:nvPr>
+        </p:nvSpPr>
+        <p:spPr/>
+        <p:txBody>
+          <a:bodyPr/>
+          <a:lstStyle/>
+          <a:p>
+            <a:fld id="{D57F1E4F-1CFF-5643-939E-217C01CDF565}" type="slidenum">
+              <a:rPr lang="en-US" smtClean="0"/>
+              <a:pPr/>
+              <a:t>5</a:t>
+            </a:fld>
+            <a:endParaRPr lang="en-US" dirty="0"/>
+          </a:p>
+        </p:txBody>
+      </p:sp>
     </p:spTree>
     <p:extLst>
       <p:ext uri="{BB962C8B-B14F-4D97-AF65-F5344CB8AC3E}">
@@ -12474,6 +13023,36 @@
           </a:effectLst>
         </p:spPr>
       </p:pic>
+      <p:sp>
+        <p:nvSpPr>
+          <p:cNvPr id="3" name="Slide Number Placeholder 2">
+            <a:extLst>
+              <a:ext uri="{FF2B5EF4-FFF2-40B4-BE49-F238E27FC236}">
+                <a16:creationId xmlns:a16="http://schemas.microsoft.com/office/drawing/2014/main" id="{8A34F6E6-BAE6-4203-955F-99A2CE7694EE}"/>
+              </a:ext>
+            </a:extLst>
+          </p:cNvPr>
+          <p:cNvSpPr>
+            <a:spLocks noGrp="1"/>
+          </p:cNvSpPr>
+          <p:nvPr>
+            <p:ph type="sldNum" sz="quarter" idx="12"/>
+          </p:nvPr>
+        </p:nvSpPr>
+        <p:spPr/>
+        <p:txBody>
+          <a:bodyPr/>
+          <a:lstStyle/>
+          <a:p>
+            <a:fld id="{D57F1E4F-1CFF-5643-939E-217C01CDF565}" type="slidenum">
+              <a:rPr lang="en-US" smtClean="0"/>
+              <a:pPr/>
+              <a:t>6</a:t>
+            </a:fld>
+            <a:endParaRPr lang="en-US" dirty="0"/>
+          </a:p>
+        </p:txBody>
+      </p:sp>
     </p:spTree>
     <p:extLst>
       <p:ext uri="{BB962C8B-B14F-4D97-AF65-F5344CB8AC3E}">
@@ -12857,6 +13436,36 @@
               <a:t>If necessary, I also have a playbook for Jenkins-Node, which can be used to raise additional nodes without problems on which some work will be performed.</a:t>
             </a:r>
             <a:endParaRPr lang="ru-RU" sz="2400" dirty="0"/>
+          </a:p>
+        </p:txBody>
+      </p:sp>
+      <p:sp>
+        <p:nvSpPr>
+          <p:cNvPr id="5" name="Slide Number Placeholder 4">
+            <a:extLst>
+              <a:ext uri="{FF2B5EF4-FFF2-40B4-BE49-F238E27FC236}">
+                <a16:creationId xmlns:a16="http://schemas.microsoft.com/office/drawing/2014/main" id="{9F697123-CAEA-45F1-9EAE-59394F90BF3E}"/>
+              </a:ext>
+            </a:extLst>
+          </p:cNvPr>
+          <p:cNvSpPr>
+            <a:spLocks noGrp="1"/>
+          </p:cNvSpPr>
+          <p:nvPr>
+            <p:ph type="sldNum" sz="quarter" idx="12"/>
+          </p:nvPr>
+        </p:nvSpPr>
+        <p:spPr/>
+        <p:txBody>
+          <a:bodyPr/>
+          <a:lstStyle/>
+          <a:p>
+            <a:fld id="{D57F1E4F-1CFF-5643-939E-217C01CDF565}" type="slidenum">
+              <a:rPr lang="en-US" smtClean="0"/>
+              <a:pPr/>
+              <a:t>7</a:t>
+            </a:fld>
+            <a:endParaRPr lang="en-US" dirty="0"/>
           </a:p>
         </p:txBody>
       </p:sp>
@@ -13565,6 +14174,36 @@
               <a:t>and some piece of patience.</a:t>
             </a:r>
             <a:endParaRPr lang="ru-RU" sz="1100" dirty="0"/>
+          </a:p>
+        </p:txBody>
+      </p:sp>
+      <p:sp>
+        <p:nvSpPr>
+          <p:cNvPr id="8" name="Slide Number Placeholder 7">
+            <a:extLst>
+              <a:ext uri="{FF2B5EF4-FFF2-40B4-BE49-F238E27FC236}">
+                <a16:creationId xmlns:a16="http://schemas.microsoft.com/office/drawing/2014/main" id="{1611FD96-364E-4C79-8CDA-8939F04C4F7F}"/>
+              </a:ext>
+            </a:extLst>
+          </p:cNvPr>
+          <p:cNvSpPr>
+            <a:spLocks noGrp="1"/>
+          </p:cNvSpPr>
+          <p:nvPr>
+            <p:ph type="sldNum" sz="quarter" idx="12"/>
+          </p:nvPr>
+        </p:nvSpPr>
+        <p:spPr/>
+        <p:txBody>
+          <a:bodyPr/>
+          <a:lstStyle/>
+          <a:p>
+            <a:fld id="{D57F1E4F-1CFF-5643-939E-217C01CDF565}" type="slidenum">
+              <a:rPr lang="en-US" smtClean="0"/>
+              <a:pPr/>
+              <a:t>8</a:t>
+            </a:fld>
+            <a:endParaRPr lang="en-US" dirty="0"/>
           </a:p>
         </p:txBody>
       </p:sp>
@@ -14430,6 +15069,36 @@
           </a:prstGeom>
         </p:spPr>
       </p:pic>
+      <p:sp>
+        <p:nvSpPr>
+          <p:cNvPr id="8" name="Slide Number Placeholder 7">
+            <a:extLst>
+              <a:ext uri="{FF2B5EF4-FFF2-40B4-BE49-F238E27FC236}">
+                <a16:creationId xmlns:a16="http://schemas.microsoft.com/office/drawing/2014/main" id="{262B1016-D869-4377-B4E5-880B581F292B}"/>
+              </a:ext>
+            </a:extLst>
+          </p:cNvPr>
+          <p:cNvSpPr>
+            <a:spLocks noGrp="1"/>
+          </p:cNvSpPr>
+          <p:nvPr>
+            <p:ph type="sldNum" sz="quarter" idx="12"/>
+          </p:nvPr>
+        </p:nvSpPr>
+        <p:spPr/>
+        <p:txBody>
+          <a:bodyPr/>
+          <a:lstStyle/>
+          <a:p>
+            <a:fld id="{D57F1E4F-1CFF-5643-939E-217C01CDF565}" type="slidenum">
+              <a:rPr lang="en-US" smtClean="0"/>
+              <a:pPr/>
+              <a:t>9</a:t>
+            </a:fld>
+            <a:endParaRPr lang="en-US" dirty="0"/>
+          </a:p>
+        </p:txBody>
+      </p:sp>
     </p:spTree>
     <p:extLst>
       <p:ext uri="{BB962C8B-B14F-4D97-AF65-F5344CB8AC3E}">
@@ -15237,4 +15906,299 @@
     </a:ext>
   </a:extLst>
 </a:theme>
+</file>
+
+<file path=ppt/theme/theme2.xml><?xml version="1.0" encoding="utf-8"?>
+<a:theme xmlns:a="http://schemas.openxmlformats.org/drawingml/2006/main" name="Office Theme">
+  <a:themeElements>
+    <a:clrScheme name="Office">
+      <a:dk1>
+        <a:sysClr val="windowText" lastClr="000000"/>
+      </a:dk1>
+      <a:lt1>
+        <a:sysClr val="window" lastClr="FFFFFF"/>
+      </a:lt1>
+      <a:dk2>
+        <a:srgbClr val="44546A"/>
+      </a:dk2>
+      <a:lt2>
+        <a:srgbClr val="E7E6E6"/>
+      </a:lt2>
+      <a:accent1>
+        <a:srgbClr val="4472C4"/>
+      </a:accent1>
+      <a:accent2>
+        <a:srgbClr val="ED7D31"/>
+      </a:accent2>
+      <a:accent3>
+        <a:srgbClr val="A5A5A5"/>
+      </a:accent3>
+      <a:accent4>
+        <a:srgbClr val="FFC000"/>
+      </a:accent4>
+      <a:accent5>
+        <a:srgbClr val="5B9BD5"/>
+      </a:accent5>
+      <a:accent6>
+        <a:srgbClr val="70AD47"/>
+      </a:accent6>
+      <a:hlink>
+        <a:srgbClr val="0563C1"/>
+      </a:hlink>
+      <a:folHlink>
+        <a:srgbClr val="954F72"/>
+      </a:folHlink>
+    </a:clrScheme>
+    <a:fontScheme name="Office">
+      <a:majorFont>
+        <a:latin typeface="Calibri Light" panose="020F0302020204030204"/>
+        <a:ea typeface=""/>
+        <a:cs typeface=""/>
+        <a:font script="Jpan" typeface="游ゴシック Light"/>
+        <a:font script="Hang" typeface="맑은 고딕"/>
+        <a:font script="Hans" typeface="等线 Light"/>
+        <a:font script="Hant" typeface="新細明體"/>
+        <a:font script="Arab" typeface="Times New Roman"/>
+        <a:font script="Hebr" typeface="Times New Roman"/>
+        <a:font script="Thai" typeface="Angsana New"/>
+        <a:font script="Ethi" typeface="Nyala"/>
+        <a:font script="Beng" typeface="Vrinda"/>
+        <a:font script="Gujr" typeface="Shruti"/>
+        <a:font script="Khmr" typeface="MoolBoran"/>
+        <a:font script="Knda" typeface="Tunga"/>
+        <a:font script="Guru" typeface="Raavi"/>
+        <a:font script="Cans" typeface="Euphemia"/>
+        <a:font script="Cher" typeface="Plantagenet Cherokee"/>
+        <a:font script="Yiii" typeface="Microsoft Yi Baiti"/>
+        <a:font script="Tibt" typeface="Microsoft Himalaya"/>
+        <a:font script="Thaa" typeface="MV Boli"/>
+        <a:font script="Deva" typeface="Mangal"/>
+        <a:font script="Telu" typeface="Gautami"/>
+        <a:font script="Taml" typeface="Latha"/>
+        <a:font script="Syrc" typeface="Estrangelo Edessa"/>
+        <a:font script="Orya" typeface="Kalinga"/>
+        <a:font script="Mlym" typeface="Kartika"/>
+        <a:font script="Laoo" typeface="DokChampa"/>
+        <a:font script="Sinh" typeface="Iskoola Pota"/>
+        <a:font script="Mong" typeface="Mongolian Baiti"/>
+        <a:font script="Viet" typeface="Times New Roman"/>
+        <a:font script="Uigh" typeface="Microsoft Uighur"/>
+        <a:font script="Geor" typeface="Sylfaen"/>
+        <a:font script="Armn" typeface="Arial"/>
+        <a:font script="Bugi" typeface="Leelawadee UI"/>
+        <a:font script="Bopo" typeface="Microsoft JhengHei"/>
+        <a:font script="Java" typeface="Javanese Text"/>
+        <a:font script="Lisu" typeface="Segoe UI"/>
+        <a:font script="Mymr" typeface="Myanmar Text"/>
+        <a:font script="Nkoo" typeface="Ebrima"/>
+        <a:font script="Olck" typeface="Nirmala UI"/>
+        <a:font script="Osma" typeface="Ebrima"/>
+        <a:font script="Phag" typeface="Phagspa"/>
+        <a:font script="Syrn" typeface="Estrangelo Edessa"/>
+        <a:font script="Syrj" typeface="Estrangelo Edessa"/>
+        <a:font script="Syre" typeface="Estrangelo Edessa"/>
+        <a:font script="Sora" typeface="Nirmala UI"/>
+        <a:font script="Tale" typeface="Microsoft Tai Le"/>
+        <a:font script="Talu" typeface="Microsoft New Tai Lue"/>
+        <a:font script="Tfng" typeface="Ebrima"/>
+      </a:majorFont>
+      <a:minorFont>
+        <a:latin typeface="Calibri" panose="020F0502020204030204"/>
+        <a:ea typeface=""/>
+        <a:cs typeface=""/>
+        <a:font script="Jpan" typeface="游ゴシック"/>
+        <a:font script="Hang" typeface="맑은 고딕"/>
+        <a:font script="Hans" typeface="等线"/>
+        <a:font script="Hant" typeface="新細明體"/>
+        <a:font script="Arab" typeface="Arial"/>
+        <a:font script="Hebr" typeface="Arial"/>
+        <a:font script="Thai" typeface="Cordia New"/>
+        <a:font script="Ethi" typeface="Nyala"/>
+        <a:font script="Beng" typeface="Vrinda"/>
+        <a:font script="Gujr" typeface="Shruti"/>
+        <a:font script="Khmr" typeface="DaunPenh"/>
+        <a:font script="Knda" typeface="Tunga"/>
+        <a:font script="Guru" typeface="Raavi"/>
+        <a:font script="Cans" typeface="Euphemia"/>
+        <a:font script="Cher" typeface="Plantagenet Cherokee"/>
+        <a:font script="Yiii" typeface="Microsoft Yi Baiti"/>
+        <a:font script="Tibt" typeface="Microsoft Himalaya"/>
+        <a:font script="Thaa" typeface="MV Boli"/>
+        <a:font script="Deva" typeface="Mangal"/>
+        <a:font script="Telu" typeface="Gautami"/>
+        <a:font script="Taml" typeface="Latha"/>
+        <a:font script="Syrc" typeface="Estrangelo Edessa"/>
+        <a:font script="Orya" typeface="Kalinga"/>
+        <a:font script="Mlym" typeface="Kartika"/>
+        <a:font script="Laoo" typeface="DokChampa"/>
+        <a:font script="Sinh" typeface="Iskoola Pota"/>
+        <a:font script="Mong" typeface="Mongolian Baiti"/>
+        <a:font script="Viet" typeface="Arial"/>
+        <a:font script="Uigh" typeface="Microsoft Uighur"/>
+        <a:font script="Geor" typeface="Sylfaen"/>
+        <a:font script="Armn" typeface="Arial"/>
+        <a:font script="Bugi" typeface="Leelawadee UI"/>
+        <a:font script="Bopo" typeface="Microsoft JhengHei"/>
+        <a:font script="Java" typeface="Javanese Text"/>
+        <a:font script="Lisu" typeface="Segoe UI"/>
+        <a:font script="Mymr" typeface="Myanmar Text"/>
+        <a:font script="Nkoo" typeface="Ebrima"/>
+        <a:font script="Olck" typeface="Nirmala UI"/>
+        <a:font script="Osma" typeface="Ebrima"/>
+        <a:font script="Phag" typeface="Phagspa"/>
+        <a:font script="Syrn" typeface="Estrangelo Edessa"/>
+        <a:font script="Syrj" typeface="Estrangelo Edessa"/>
+        <a:font script="Syre" typeface="Estrangelo Edessa"/>
+        <a:font script="Sora" typeface="Nirmala UI"/>
+        <a:font script="Tale" typeface="Microsoft Tai Le"/>
+        <a:font script="Talu" typeface="Microsoft New Tai Lue"/>
+        <a:font script="Tfng" typeface="Ebrima"/>
+      </a:minorFont>
+    </a:fontScheme>
+    <a:fmtScheme name="Office">
+      <a:fillStyleLst>
+        <a:solidFill>
+          <a:schemeClr val="phClr"/>
+        </a:solidFill>
+        <a:gradFill rotWithShape="1">
+          <a:gsLst>
+            <a:gs pos="0">
+              <a:schemeClr val="phClr">
+                <a:lumMod val="110000"/>
+                <a:satMod val="105000"/>
+                <a:tint val="67000"/>
+              </a:schemeClr>
+            </a:gs>
+            <a:gs pos="50000">
+              <a:schemeClr val="phClr">
+                <a:lumMod val="105000"/>
+                <a:satMod val="103000"/>
+                <a:tint val="73000"/>
+              </a:schemeClr>
+            </a:gs>
+            <a:gs pos="100000">
+              <a:schemeClr val="phClr">
+                <a:lumMod val="105000"/>
+                <a:satMod val="109000"/>
+                <a:tint val="81000"/>
+              </a:schemeClr>
+            </a:gs>
+          </a:gsLst>
+          <a:lin ang="5400000" scaled="0"/>
+        </a:gradFill>
+        <a:gradFill rotWithShape="1">
+          <a:gsLst>
+            <a:gs pos="0">
+              <a:schemeClr val="phClr">
+                <a:satMod val="103000"/>
+                <a:lumMod val="102000"/>
+                <a:tint val="94000"/>
+              </a:schemeClr>
+            </a:gs>
+            <a:gs pos="50000">
+              <a:schemeClr val="phClr">
+                <a:satMod val="110000"/>
+                <a:lumMod val="100000"/>
+                <a:shade val="100000"/>
+              </a:schemeClr>
+            </a:gs>
+            <a:gs pos="100000">
+              <a:schemeClr val="phClr">
+                <a:lumMod val="99000"/>
+                <a:satMod val="120000"/>
+                <a:shade val="78000"/>
+              </a:schemeClr>
+            </a:gs>
+          </a:gsLst>
+          <a:lin ang="5400000" scaled="0"/>
+        </a:gradFill>
+      </a:fillStyleLst>
+      <a:lnStyleLst>
+        <a:ln w="6350" cap="flat" cmpd="sng" algn="ctr">
+          <a:solidFill>
+            <a:schemeClr val="phClr"/>
+          </a:solidFill>
+          <a:prstDash val="solid"/>
+          <a:miter lim="800000"/>
+        </a:ln>
+        <a:ln w="12700" cap="flat" cmpd="sng" algn="ctr">
+          <a:solidFill>
+            <a:schemeClr val="phClr"/>
+          </a:solidFill>
+          <a:prstDash val="solid"/>
+          <a:miter lim="800000"/>
+        </a:ln>
+        <a:ln w="19050" cap="flat" cmpd="sng" algn="ctr">
+          <a:solidFill>
+            <a:schemeClr val="phClr"/>
+          </a:solidFill>
+          <a:prstDash val="solid"/>
+          <a:miter lim="800000"/>
+        </a:ln>
+      </a:lnStyleLst>
+      <a:effectStyleLst>
+        <a:effectStyle>
+          <a:effectLst/>
+        </a:effectStyle>
+        <a:effectStyle>
+          <a:effectLst/>
+        </a:effectStyle>
+        <a:effectStyle>
+          <a:effectLst>
+            <a:outerShdw blurRad="57150" dist="19050" dir="5400000" algn="ctr" rotWithShape="0">
+              <a:srgbClr val="000000">
+                <a:alpha val="63000"/>
+              </a:srgbClr>
+            </a:outerShdw>
+          </a:effectLst>
+        </a:effectStyle>
+      </a:effectStyleLst>
+      <a:bgFillStyleLst>
+        <a:solidFill>
+          <a:schemeClr val="phClr"/>
+        </a:solidFill>
+        <a:solidFill>
+          <a:schemeClr val="phClr">
+            <a:tint val="95000"/>
+            <a:satMod val="170000"/>
+          </a:schemeClr>
+        </a:solidFill>
+        <a:gradFill rotWithShape="1">
+          <a:gsLst>
+            <a:gs pos="0">
+              <a:schemeClr val="phClr">
+                <a:tint val="93000"/>
+                <a:satMod val="150000"/>
+                <a:shade val="98000"/>
+                <a:lumMod val="102000"/>
+              </a:schemeClr>
+            </a:gs>
+            <a:gs pos="50000">
+              <a:schemeClr val="phClr">
+                <a:tint val="98000"/>
+                <a:satMod val="130000"/>
+                <a:shade val="90000"/>
+                <a:lumMod val="103000"/>
+              </a:schemeClr>
+            </a:gs>
+            <a:gs pos="100000">
+              <a:schemeClr val="phClr">
+                <a:shade val="63000"/>
+                <a:satMod val="120000"/>
+              </a:schemeClr>
+            </a:gs>
+          </a:gsLst>
+          <a:lin ang="5400000" scaled="0"/>
+        </a:gradFill>
+      </a:bgFillStyleLst>
+    </a:fmtScheme>
+  </a:themeElements>
+  <a:objectDefaults/>
+  <a:extraClrSchemeLst/>
+  <a:extLst>
+    <a:ext uri="{05A4C25C-085E-4340-85A3-A5531E510DB2}">
+      <thm15:themeFamily xmlns:thm15="http://schemas.microsoft.com/office/thememl/2012/main" name="Office Theme" id="{62F939B6-93AF-4DB8-9C6B-D6C7DFDC589F}" vid="{4A3C46E8-61CC-4603-A589-7422A47A8E4A}"/>
+    </a:ext>
+  </a:extLst>
+</a:theme>
 </file>
</xml_diff>